<commit_message>
Site updated: 2023-07-17 19:39:13
</commit_message>
<xml_diff>
--- a/pdf/新建 Microsoft PowerPoint 演示文稿.pptx
+++ b/pdf/新建 Microsoft PowerPoint 演示文稿.pptx
@@ -6,7 +6,8 @@
   </p:sldMasterIdLst>
   <p:sldIdLst>
     <p:sldId id="256" r:id="rId2"/>
-    <p:sldId id="257" r:id="rId3"/>
+    <p:sldId id="259" r:id="rId3"/>
+    <p:sldId id="257" r:id="rId4"/>
   </p:sldIdLst>
   <p:sldSz cx="12192000" cy="6858000"/>
   <p:notesSz cx="6858000" cy="9144000"/>
@@ -105,6 +106,11 @@
       </a:defRPr>
     </a:lvl9pPr>
   </p:defaultTextStyle>
+  <p:extLst>
+    <p:ext uri="{EFAFB233-063F-42B5-8137-9DF3F51BA10A}">
+      <p15:sldGuideLst xmlns:p15="http://schemas.microsoft.com/office/powerpoint/2012/main"/>
+    </p:ext>
+  </p:extLst>
 </p:presentation>
 </file>
 
@@ -255,7 +261,7 @@
           <a:p>
             <a:fld id="{D3CDA85B-A002-4176-B1D3-5D480D11225F}" type="datetimeFigureOut">
               <a:rPr lang="zh-CN" altLang="en-US" smtClean="0"/>
-              <a:t>2023/7/16</a:t>
+              <a:t>2023/7/17</a:t>
             </a:fld>
             <a:endParaRPr lang="zh-CN" altLang="en-US"/>
           </a:p>
@@ -453,7 +459,7 @@
           <a:p>
             <a:fld id="{D3CDA85B-A002-4176-B1D3-5D480D11225F}" type="datetimeFigureOut">
               <a:rPr lang="zh-CN" altLang="en-US" smtClean="0"/>
-              <a:t>2023/7/16</a:t>
+              <a:t>2023/7/17</a:t>
             </a:fld>
             <a:endParaRPr lang="zh-CN" altLang="en-US"/>
           </a:p>
@@ -661,7 +667,7 @@
           <a:p>
             <a:fld id="{D3CDA85B-A002-4176-B1D3-5D480D11225F}" type="datetimeFigureOut">
               <a:rPr lang="zh-CN" altLang="en-US" smtClean="0"/>
-              <a:t>2023/7/16</a:t>
+              <a:t>2023/7/17</a:t>
             </a:fld>
             <a:endParaRPr lang="zh-CN" altLang="en-US"/>
           </a:p>
@@ -859,7 +865,7 @@
           <a:p>
             <a:fld id="{D3CDA85B-A002-4176-B1D3-5D480D11225F}" type="datetimeFigureOut">
               <a:rPr lang="zh-CN" altLang="en-US" smtClean="0"/>
-              <a:t>2023/7/16</a:t>
+              <a:t>2023/7/17</a:t>
             </a:fld>
             <a:endParaRPr lang="zh-CN" altLang="en-US"/>
           </a:p>
@@ -1134,7 +1140,7 @@
           <a:p>
             <a:fld id="{D3CDA85B-A002-4176-B1D3-5D480D11225F}" type="datetimeFigureOut">
               <a:rPr lang="zh-CN" altLang="en-US" smtClean="0"/>
-              <a:t>2023/7/16</a:t>
+              <a:t>2023/7/17</a:t>
             </a:fld>
             <a:endParaRPr lang="zh-CN" altLang="en-US"/>
           </a:p>
@@ -1399,7 +1405,7 @@
           <a:p>
             <a:fld id="{D3CDA85B-A002-4176-B1D3-5D480D11225F}" type="datetimeFigureOut">
               <a:rPr lang="zh-CN" altLang="en-US" smtClean="0"/>
-              <a:t>2023/7/16</a:t>
+              <a:t>2023/7/17</a:t>
             </a:fld>
             <a:endParaRPr lang="zh-CN" altLang="en-US"/>
           </a:p>
@@ -1811,7 +1817,7 @@
           <a:p>
             <a:fld id="{D3CDA85B-A002-4176-B1D3-5D480D11225F}" type="datetimeFigureOut">
               <a:rPr lang="zh-CN" altLang="en-US" smtClean="0"/>
-              <a:t>2023/7/16</a:t>
+              <a:t>2023/7/17</a:t>
             </a:fld>
             <a:endParaRPr lang="zh-CN" altLang="en-US"/>
           </a:p>
@@ -1952,7 +1958,7 @@
           <a:p>
             <a:fld id="{D3CDA85B-A002-4176-B1D3-5D480D11225F}" type="datetimeFigureOut">
               <a:rPr lang="zh-CN" altLang="en-US" smtClean="0"/>
-              <a:t>2023/7/16</a:t>
+              <a:t>2023/7/17</a:t>
             </a:fld>
             <a:endParaRPr lang="zh-CN" altLang="en-US"/>
           </a:p>
@@ -2065,7 +2071,7 @@
           <a:p>
             <a:fld id="{D3CDA85B-A002-4176-B1D3-5D480D11225F}" type="datetimeFigureOut">
               <a:rPr lang="zh-CN" altLang="en-US" smtClean="0"/>
-              <a:t>2023/7/16</a:t>
+              <a:t>2023/7/17</a:t>
             </a:fld>
             <a:endParaRPr lang="zh-CN" altLang="en-US"/>
           </a:p>
@@ -2376,7 +2382,7 @@
           <a:p>
             <a:fld id="{D3CDA85B-A002-4176-B1D3-5D480D11225F}" type="datetimeFigureOut">
               <a:rPr lang="zh-CN" altLang="en-US" smtClean="0"/>
-              <a:t>2023/7/16</a:t>
+              <a:t>2023/7/17</a:t>
             </a:fld>
             <a:endParaRPr lang="zh-CN" altLang="en-US"/>
           </a:p>
@@ -2664,7 +2670,7 @@
           <a:p>
             <a:fld id="{D3CDA85B-A002-4176-B1D3-5D480D11225F}" type="datetimeFigureOut">
               <a:rPr lang="zh-CN" altLang="en-US" smtClean="0"/>
-              <a:t>2023/7/16</a:t>
+              <a:t>2023/7/17</a:t>
             </a:fld>
             <a:endParaRPr lang="zh-CN" altLang="en-US"/>
           </a:p>
@@ -2905,7 +2911,7 @@
           <a:p>
             <a:fld id="{D3CDA85B-A002-4176-B1D3-5D480D11225F}" type="datetimeFigureOut">
               <a:rPr lang="zh-CN" altLang="en-US" smtClean="0"/>
-              <a:t>2023/7/16</a:t>
+              <a:t>2023/7/17</a:t>
             </a:fld>
             <a:endParaRPr lang="zh-CN" altLang="en-US"/>
           </a:p>
@@ -11530,6 +11536,36 @@
           <a:chExt cx="0" cy="0"/>
         </a:xfrm>
       </p:grpSpPr>
+    </p:spTree>
+    <p:extLst>
+      <p:ext uri="{BB962C8B-B14F-4D97-AF65-F5344CB8AC3E}">
+        <p14:creationId xmlns:p14="http://schemas.microsoft.com/office/powerpoint/2010/main" val="3202362328"/>
+      </p:ext>
+    </p:extLst>
+  </p:cSld>
+  <p:clrMapOvr>
+    <a:masterClrMapping/>
+  </p:clrMapOvr>
+</p:sld>
+</file>
+
+<file path=ppt/slides/slide3.xml><?xml version="1.0" encoding="utf-8"?>
+<p:sld xmlns:a="http://schemas.openxmlformats.org/drawingml/2006/main" xmlns:r="http://schemas.openxmlformats.org/officeDocument/2006/relationships" xmlns:p="http://schemas.openxmlformats.org/presentationml/2006/main">
+  <p:cSld>
+    <p:spTree>
+      <p:nvGrpSpPr>
+        <p:cNvPr id="1" name=""/>
+        <p:cNvGrpSpPr/>
+        <p:nvPr/>
+      </p:nvGrpSpPr>
+      <p:grpSpPr>
+        <a:xfrm>
+          <a:off x="0" y="0"/>
+          <a:ext cx="0" cy="0"/>
+          <a:chOff x="0" y="0"/>
+          <a:chExt cx="0" cy="0"/>
+        </a:xfrm>
+      </p:grpSpPr>
       <p:pic>
         <p:nvPicPr>
           <p:cNvPr id="2" name="Picture 75">

</xml_diff>